<commit_message>
Ajout de la partie concernant la vérification du fichier Excel.
</commit_message>
<xml_diff>
--- a/PROJET/Presentation/PRE_26-01-11.pptx
+++ b/PROJET/Presentation/PRE_26-01-11.pptx
@@ -5,14 +5,15 @@
     <p:sldMasterId id="2147483695" r:id="rId4"/>
   </p:sldMasterIdLst>
   <p:notesMasterIdLst>
-    <p:notesMasterId r:id="rId7"/>
+    <p:notesMasterId r:id="rId8"/>
   </p:notesMasterIdLst>
   <p:handoutMasterIdLst>
-    <p:handoutMasterId r:id="rId8"/>
+    <p:handoutMasterId r:id="rId9"/>
   </p:handoutMasterIdLst>
   <p:sldIdLst>
     <p:sldId id="264" r:id="rId5"/>
     <p:sldId id="309" r:id="rId6"/>
+    <p:sldId id="312" r:id="rId7"/>
   </p:sldIdLst>
   <p:sldSz cx="9144000" cy="6858000" type="screen4x3"/>
   <p:notesSz cx="6858000" cy="9004300"/>
@@ -24,7 +25,7 @@
     </p:custShow>
   </p:custShowLst>
   <p:custDataLst>
-    <p:tags r:id="rId9"/>
+    <p:tags r:id="rId10"/>
   </p:custDataLst>
   <p:defaultTextStyle>
     <a:defPPr>
@@ -393,7 +394,7 @@
     </p:spTree>
     <p:extLst>
       <p:ext uri="{BB962C8B-B14F-4D97-AF65-F5344CB8AC3E}">
-        <p14:creationId xmlns:p14="http://schemas.microsoft.com/office/powerpoint/2010/main" val="3231300367"/>
+        <p14:creationId xmlns="" xmlns:p14="http://schemas.microsoft.com/office/powerpoint/2010/main" val="3231300367"/>
       </p:ext>
     </p:extLst>
   </p:cSld>
@@ -740,7 +741,7 @@
     </p:spTree>
     <p:extLst>
       <p:ext uri="{BB962C8B-B14F-4D97-AF65-F5344CB8AC3E}">
-        <p14:creationId xmlns:p14="http://schemas.microsoft.com/office/powerpoint/2010/main" val="2645942092"/>
+        <p14:creationId xmlns="" xmlns:p14="http://schemas.microsoft.com/office/powerpoint/2010/main" val="2645942092"/>
       </p:ext>
     </p:extLst>
   </p:cSld>
@@ -898,6 +899,10 @@
           </p:nvPr>
         </p:nvSpPr>
         <p:spPr>
+          <a:xfrm>
+            <a:off x="1177925" y="674688"/>
+            <a:ext cx="4503738" cy="3378200"/>
+          </a:xfrm>
           <a:ln/>
         </p:spPr>
       </p:sp>
@@ -988,6 +993,10 @@
           </p:nvPr>
         </p:nvSpPr>
         <p:spPr>
+          <a:xfrm>
+            <a:off x="1177925" y="674688"/>
+            <a:ext cx="4503738" cy="3378200"/>
+          </a:xfrm>
           <a:ln/>
         </p:spPr>
       </p:sp>
@@ -1056,7 +1065,7 @@
     <p:bg>
       <p:bgPr>
         <a:blipFill dpi="0" rotWithShape="0">
-          <a:blip r:embed="rId2"/>
+          <a:blip r:embed="rId2" cstate="print"/>
           <a:srcRect/>
           <a:stretch>
             <a:fillRect/>
@@ -1091,7 +1100,7 @@
         </p:nvSpPr>
         <p:spPr>
           <a:xfrm>
-            <a:off x="304800" y="4038600"/>
+            <a:off x="304800" y="4038601"/>
             <a:ext cx="7924800" cy="947738"/>
           </a:xfrm>
         </p:spPr>
@@ -1458,8 +1467,8 @@
         </p:nvSpPr>
         <p:spPr>
           <a:xfrm>
-            <a:off x="7067550" y="76200"/>
-            <a:ext cx="1847850" cy="6477000"/>
+            <a:off x="7067549" y="76200"/>
+            <a:ext cx="1847851" cy="6477000"/>
           </a:xfrm>
         </p:spPr>
         <p:txBody>
@@ -1486,8 +1495,8 @@
         </p:nvSpPr>
         <p:spPr>
           <a:xfrm>
-            <a:off x="1524000" y="76200"/>
-            <a:ext cx="5391150" cy="6477000"/>
+            <a:off x="1524002" y="76200"/>
+            <a:ext cx="5391151" cy="6477000"/>
           </a:xfrm>
         </p:spPr>
         <p:txBody>
@@ -1882,7 +1891,7 @@
         </p:nvSpPr>
         <p:spPr>
           <a:xfrm>
-            <a:off x="722313" y="2906713"/>
+            <a:off x="722313" y="2906715"/>
             <a:ext cx="7772400" cy="1500187"/>
           </a:xfrm>
         </p:spPr>
@@ -2086,7 +2095,7 @@
         </p:nvSpPr>
         <p:spPr>
           <a:xfrm>
-            <a:off x="1524000" y="1295400"/>
+            <a:off x="1524002" y="1295400"/>
             <a:ext cx="3619500" cy="5257800"/>
           </a:xfrm>
         </p:spPr>
@@ -2171,7 +2180,7 @@
         </p:nvSpPr>
         <p:spPr>
           <a:xfrm>
-            <a:off x="5295900" y="1295400"/>
+            <a:off x="5295902" y="1295400"/>
             <a:ext cx="3619500" cy="5257800"/>
           </a:xfrm>
         </p:spPr>
@@ -2404,7 +2413,7 @@
         </p:nvSpPr>
         <p:spPr>
           <a:xfrm>
-            <a:off x="457200" y="1535113"/>
+            <a:off x="457202" y="1535113"/>
             <a:ext cx="4040188" cy="639762"/>
           </a:xfrm>
         </p:spPr>
@@ -2469,7 +2478,7 @@
         </p:nvSpPr>
         <p:spPr>
           <a:xfrm>
-            <a:off x="457200" y="2174875"/>
+            <a:off x="457202" y="2174875"/>
             <a:ext cx="4040188" cy="3951288"/>
           </a:xfrm>
         </p:spPr>
@@ -2554,7 +2563,7 @@
         </p:nvSpPr>
         <p:spPr>
           <a:xfrm>
-            <a:off x="4645025" y="1535113"/>
+            <a:off x="4645027" y="1535113"/>
             <a:ext cx="4041775" cy="639762"/>
           </a:xfrm>
         </p:spPr>
@@ -2619,7 +2628,7 @@
         </p:nvSpPr>
         <p:spPr>
           <a:xfrm>
-            <a:off x="4645025" y="2174875"/>
+            <a:off x="4645027" y="2174875"/>
             <a:ext cx="4041775" cy="3951288"/>
           </a:xfrm>
         </p:spPr>
@@ -3075,7 +3084,7 @@
         </p:nvSpPr>
         <p:spPr>
           <a:xfrm>
-            <a:off x="457200" y="273050"/>
+            <a:off x="457202" y="273050"/>
             <a:ext cx="3008313" cy="1162050"/>
           </a:xfrm>
         </p:spPr>
@@ -3107,8 +3116,8 @@
         </p:nvSpPr>
         <p:spPr>
           <a:xfrm>
-            <a:off x="3575050" y="273050"/>
-            <a:ext cx="5111750" cy="5853113"/>
+            <a:off x="3575051" y="273052"/>
+            <a:ext cx="5111751" cy="5853113"/>
           </a:xfrm>
         </p:spPr>
         <p:txBody>
@@ -3192,7 +3201,7 @@
         </p:nvSpPr>
         <p:spPr>
           <a:xfrm>
-            <a:off x="457200" y="1435100"/>
+            <a:off x="457202" y="1435102"/>
             <a:ext cx="3008313" cy="4691063"/>
           </a:xfrm>
         </p:spPr>
@@ -3373,7 +3382,7 @@
         </p:nvSpPr>
         <p:spPr>
           <a:xfrm>
-            <a:off x="1792288" y="4800600"/>
+            <a:off x="1792288" y="4800601"/>
             <a:ext cx="5486400" cy="566738"/>
           </a:xfrm>
         </p:spPr>
@@ -3470,7 +3479,7 @@
         </p:nvSpPr>
         <p:spPr>
           <a:xfrm>
-            <a:off x="1792288" y="5367338"/>
+            <a:off x="1792288" y="5367339"/>
             <a:ext cx="5486400" cy="804862"/>
           </a:xfrm>
         </p:spPr>
@@ -3628,7 +3637,7 @@
     <p:bg bwMode="gray">
       <p:bgPr>
         <a:blipFill dpi="0" rotWithShape="0">
-          <a:blip r:embed="rId13"/>
+          <a:blip r:embed="rId13" cstate="print"/>
           <a:srcRect/>
           <a:stretch>
             <a:fillRect/>
@@ -4377,7 +4386,7 @@
         </p:nvSpPr>
         <p:spPr>
           <a:xfrm>
-            <a:off x="1000125" y="2571750"/>
+            <a:off x="1000125" y="2571752"/>
             <a:ext cx="7772400" cy="1470025"/>
           </a:xfrm>
         </p:spPr>
@@ -4477,7 +4486,7 @@
         </p:nvSpPr>
         <p:spPr bwMode="auto">
           <a:xfrm>
-            <a:off x="5795963" y="6161088"/>
+            <a:off x="5795964" y="6161089"/>
             <a:ext cx="2890837" cy="196850"/>
           </a:xfrm>
           <a:prstGeom prst="rect">
@@ -4636,6 +4645,163 @@
           </a:p>
         </p:txBody>
       </p:sp>
+    </p:spTree>
+  </p:cSld>
+  <p:clrMapOvr>
+    <a:masterClrMapping/>
+  </p:clrMapOvr>
+  <p:timing>
+    <p:tnLst>
+      <p:par>
+        <p:cTn id="1" dur="indefinite" restart="never" nodeType="tmRoot"/>
+      </p:par>
+    </p:tnLst>
+  </p:timing>
+</p:sld>
+</file>
+
+<file path=ppt/slides/slide3.xml><?xml version="1.0" encoding="utf-8"?>
+<p:sld xmlns:a="http://schemas.openxmlformats.org/drawingml/2006/main" xmlns:r="http://schemas.openxmlformats.org/officeDocument/2006/relationships" xmlns:p="http://schemas.openxmlformats.org/presentationml/2006/main">
+  <p:cSld>
+    <p:spTree>
+      <p:nvGrpSpPr>
+        <p:cNvPr id="1" name=""/>
+        <p:cNvGrpSpPr/>
+        <p:nvPr/>
+      </p:nvGrpSpPr>
+      <p:grpSpPr>
+        <a:xfrm>
+          <a:off x="0" y="0"/>
+          <a:ext cx="0" cy="0"/>
+          <a:chOff x="0" y="0"/>
+          <a:chExt cx="0" cy="0"/>
+        </a:xfrm>
+      </p:grpSpPr>
+      <p:sp>
+        <p:nvSpPr>
+          <p:cNvPr id="2" name="Titre 1"/>
+          <p:cNvSpPr>
+            <a:spLocks noGrp="1"/>
+          </p:cNvSpPr>
+          <p:nvPr>
+            <p:ph type="title"/>
+          </p:nvPr>
+        </p:nvSpPr>
+        <p:spPr/>
+        <p:txBody>
+          <a:bodyPr/>
+          <a:lstStyle/>
+          <a:p>
+            <a:r>
+              <a:rPr lang="fr-FR" dirty="0" smtClean="0"/>
+              <a:t>Alimentation/ETL</a:t>
+            </a:r>
+            <a:endParaRPr lang="fr-FR" dirty="0"/>
+          </a:p>
+        </p:txBody>
+      </p:sp>
+      <p:sp>
+        <p:nvSpPr>
+          <p:cNvPr id="3" name="Espace réservé du contenu 2"/>
+          <p:cNvSpPr>
+            <a:spLocks noGrp="1"/>
+          </p:cNvSpPr>
+          <p:nvPr>
+            <p:ph sz="half" idx="1"/>
+          </p:nvPr>
+        </p:nvSpPr>
+        <p:spPr/>
+        <p:txBody>
+          <a:bodyPr/>
+          <a:lstStyle/>
+          <a:p>
+            <a:r>
+              <a:rPr lang="fr-FR" dirty="0" smtClean="0"/>
+              <a:t>Vérification de la structure du fichier Excel avant mise à jour de la BDD:</a:t>
+            </a:r>
+          </a:p>
+          <a:p>
+            <a:pPr lvl="1"/>
+            <a:r>
+              <a:rPr lang="fr-FR" dirty="0" smtClean="0"/>
+              <a:t>CU pour un fichier d’alimentation annuelle</a:t>
+            </a:r>
+          </a:p>
+          <a:p>
+            <a:pPr lvl="1"/>
+            <a:r>
+              <a:rPr lang="fr-FR" dirty="0" smtClean="0"/>
+              <a:t>CU pour un fichier d’alimentation </a:t>
+            </a:r>
+            <a:r>
+              <a:rPr lang="fr-FR" smtClean="0"/>
+              <a:t>mensuelle </a:t>
+            </a:r>
+            <a:r>
+              <a:rPr lang="fr-FR" smtClean="0">
+                <a:sym typeface="Wingdings" pitchFamily="2" charset="2"/>
+              </a:rPr>
+              <a:t></a:t>
+            </a:r>
+            <a:endParaRPr lang="fr-FR" dirty="0" smtClean="0"/>
+          </a:p>
+          <a:p>
+            <a:endParaRPr lang="fr-FR" dirty="0"/>
+          </a:p>
+        </p:txBody>
+      </p:sp>
+      <p:sp>
+        <p:nvSpPr>
+          <p:cNvPr id="5" name="Espace réservé du numéro de diapositive 4"/>
+          <p:cNvSpPr>
+            <a:spLocks noGrp="1"/>
+          </p:cNvSpPr>
+          <p:nvPr>
+            <p:ph type="sldNum" sz="quarter" idx="12"/>
+          </p:nvPr>
+        </p:nvSpPr>
+        <p:spPr/>
+        <p:txBody>
+          <a:bodyPr/>
+          <a:lstStyle/>
+          <a:p>
+            <a:pPr>
+              <a:defRPr/>
+            </a:pPr>
+            <a:fld id="{61DFC3F3-F69D-4837-9DC8-BB26BAF3FB8D}" type="slidenum">
+              <a:rPr lang="fr-FR" smtClean="0"/>
+              <a:pPr>
+                <a:defRPr/>
+              </a:pPr>
+              <a:t>3</a:t>
+            </a:fld>
+            <a:endParaRPr lang="fr-FR"/>
+          </a:p>
+        </p:txBody>
+      </p:sp>
+      <p:pic>
+        <p:nvPicPr>
+          <p:cNvPr id="6" name="Espace réservé du contenu 4" descr="CU_VerifFichierMensuel.png"/>
+          <p:cNvPicPr>
+            <a:picLocks noGrp="1" noChangeAspect="1"/>
+          </p:cNvPicPr>
+          <p:nvPr>
+            <p:ph idx="1"/>
+          </p:nvPr>
+        </p:nvPicPr>
+        <p:blipFill>
+          <a:blip r:embed="rId2" cstate="print"/>
+          <a:stretch>
+            <a:fillRect/>
+          </a:stretch>
+        </p:blipFill>
+        <p:spPr>
+          <a:xfrm>
+            <a:off x="5275320" y="1295400"/>
+            <a:ext cx="3833184" cy="5257800"/>
+          </a:xfrm>
+        </p:spPr>
+      </p:pic>
     </p:spTree>
   </p:cSld>
   <p:clrMapOvr>

</xml_diff>

<commit_message>
EFO ajout slide jasper
</commit_message>
<xml_diff>
--- a/PROJET/Presentation/PRE_26-01-11.pptx
+++ b/PROJET/Presentation/PRE_26-01-11.pptx
@@ -18,7 +18,7 @@
     <p:sldId id="315" r:id="rId9"/>
     <p:sldId id="313" r:id="rId10"/>
     <p:sldId id="316" r:id="rId11"/>
-    <p:sldId id="314" r:id="rId12"/>
+    <p:sldId id="319" r:id="rId12"/>
     <p:sldId id="312" r:id="rId13"/>
   </p:sldIdLst>
   <p:sldSz cx="9144000" cy="6858000" type="screen4x3"/>
@@ -163,18 +163,40 @@
 
 <file path=ppt/charts/chart1.xml><?xml version="1.0" encoding="utf-8"?>
 <c:chartSpace xmlns:c="http://schemas.openxmlformats.org/drawingml/2006/chart" xmlns:a="http://schemas.openxmlformats.org/drawingml/2006/main" xmlns:r="http://schemas.openxmlformats.org/officeDocument/2006/relationships">
+  <c:date1904 val="0"/>
   <c:lang val="fr-FR"/>
-  <c:style val="18"/>
+  <c:roundedCorners val="0"/>
+  <mc:AlternateContent xmlns:mc="http://schemas.openxmlformats.org/markup-compatibility/2006">
+    <mc:Choice xmlns:c14="http://schemas.microsoft.com/office/drawing/2007/8/2/chart" Requires="c14">
+      <c14:style val="118"/>
+    </mc:Choice>
+    <mc:Fallback>
+      <c:style val="18"/>
+    </mc:Fallback>
+  </mc:AlternateContent>
   <c:chart>
     <c:autoTitleDeleted val="1"/>
     <c:view3D>
+      <c:rotX val="15"/>
+      <c:rotY val="20"/>
+      <c:rAngAx val="0"/>
       <c:perspective val="30"/>
     </c:view3D>
+    <c:floor>
+      <c:thickness val="0"/>
+    </c:floor>
+    <c:sideWall>
+      <c:thickness val="0"/>
+    </c:sideWall>
+    <c:backWall>
+      <c:thickness val="0"/>
+    </c:backWall>
     <c:plotArea>
       <c:layout/>
       <c:bar3DChart>
         <c:barDir val="bar"/>
         <c:grouping val="clustered"/>
+        <c:varyColors val="0"/>
         <c:ser>
           <c:idx val="0"/>
           <c:order val="0"/>
@@ -189,6 +211,7 @@
               </c:strCache>
             </c:strRef>
           </c:tx>
+          <c:invertIfNegative val="0"/>
           <c:dLbls>
             <c:txPr>
               <a:bodyPr/>
@@ -200,7 +223,13 @@
                 <a:endParaRPr lang="fr-FR"/>
               </a:p>
             </c:txPr>
+            <c:showLegendKey val="0"/>
             <c:showVal val="1"/>
+            <c:showCatName val="0"/>
+            <c:showSerName val="0"/>
+            <c:showPercent val="0"/>
+            <c:showBubbleSize val="0"/>
+            <c:showLeaderLines val="0"/>
           </c:dLbls>
           <c:cat>
             <c:strRef>
@@ -270,6 +299,7 @@
               </c:strCache>
             </c:strRef>
           </c:tx>
+          <c:invertIfNegative val="0"/>
           <c:dLbls>
             <c:txPr>
               <a:bodyPr/>
@@ -281,7 +311,13 @@
                 <a:endParaRPr lang="fr-FR"/>
               </a:p>
             </c:txPr>
+            <c:showLegendKey val="0"/>
             <c:showVal val="1"/>
+            <c:showCatName val="0"/>
+            <c:showSerName val="0"/>
+            <c:showPercent val="0"/>
+            <c:showBubbleSize val="0"/>
+            <c:showLeaderLines val="0"/>
           </c:dLbls>
           <c:cat>
             <c:strRef>
@@ -351,6 +387,7 @@
               </c:strCache>
             </c:strRef>
           </c:tx>
+          <c:invertIfNegative val="0"/>
           <c:dLbls>
             <c:txPr>
               <a:bodyPr/>
@@ -362,7 +399,13 @@
                 <a:endParaRPr lang="fr-FR"/>
               </a:p>
             </c:txPr>
+            <c:showLegendKey val="0"/>
             <c:showVal val="1"/>
+            <c:showCatName val="0"/>
+            <c:showSerName val="0"/>
+            <c:showPercent val="0"/>
+            <c:showBubbleSize val="0"/>
+            <c:showLeaderLines val="0"/>
           </c:dLbls>
           <c:cat>
             <c:strRef>
@@ -419,20 +462,28 @@
           </c:val>
         </c:ser>
         <c:dLbls>
+          <c:showLegendKey val="0"/>
           <c:showVal val="1"/>
+          <c:showCatName val="0"/>
+          <c:showSerName val="0"/>
+          <c:showPercent val="0"/>
+          <c:showBubbleSize val="0"/>
         </c:dLbls>
+        <c:gapWidth val="150"/>
         <c:shape val="box"/>
-        <c:axId val="96123136"/>
-        <c:axId val="96804864"/>
+        <c:axId val="68992384"/>
+        <c:axId val="69002368"/>
         <c:axId val="0"/>
       </c:bar3DChart>
       <c:catAx>
-        <c:axId val="96123136"/>
+        <c:axId val="68992384"/>
         <c:scaling>
           <c:orientation val="minMax"/>
         </c:scaling>
+        <c:delete val="0"/>
         <c:axPos val="l"/>
         <c:majorTickMark val="none"/>
+        <c:minorTickMark val="none"/>
         <c:tickLblPos val="nextTo"/>
         <c:txPr>
           <a:bodyPr/>
@@ -444,14 +495,15 @@
             <a:endParaRPr lang="fr-FR"/>
           </a:p>
         </c:txPr>
-        <c:crossAx val="96804864"/>
+        <c:crossAx val="69002368"/>
         <c:crosses val="autoZero"/>
         <c:auto val="1"/>
         <c:lblAlgn val="ctr"/>
         <c:lblOffset val="100"/>
+        <c:noMultiLvlLbl val="0"/>
       </c:catAx>
       <c:valAx>
-        <c:axId val="96804864"/>
+        <c:axId val="69002368"/>
         <c:scaling>
           <c:orientation val="minMax"/>
         </c:scaling>
@@ -459,8 +511,9 @@
         <c:axPos val="b"/>
         <c:numFmt formatCode="0.0" sourceLinked="1"/>
         <c:majorTickMark val="none"/>
+        <c:minorTickMark val="none"/>
         <c:tickLblPos val="none"/>
-        <c:crossAx val="96123136"/>
+        <c:crossAx val="68992384"/>
         <c:crosses val="autoZero"/>
         <c:crossBetween val="between"/>
       </c:valAx>
@@ -477,6 +530,7 @@
           <c:h val="5.8474729914014444E-2"/>
         </c:manualLayout>
       </c:layout>
+      <c:overlay val="0"/>
       <c:txPr>
         <a:bodyPr/>
         <a:lstStyle/>
@@ -490,8 +544,11 @@
     </c:legend>
     <c:plotVisOnly val="1"/>
     <c:dispBlanksAs val="gap"/>
+    <c:showDLblsOverMax val="0"/>
   </c:chart>
-  <c:externalData r:id="rId1"/>
+  <c:externalData r:id="rId1">
+    <c:autoUpdate val="0"/>
+  </c:externalData>
 </c:chartSpace>
 </file>
 
@@ -734,7 +791,7 @@
     </p:spTree>
     <p:extLst>
       <p:ext uri="{BB962C8B-B14F-4D97-AF65-F5344CB8AC3E}">
-        <p14:creationId xmlns:p14="http://schemas.microsoft.com/office/powerpoint/2010/main" xmlns="" val="3231300367"/>
+        <p14:creationId xmlns:p14="http://schemas.microsoft.com/office/powerpoint/2010/main" val="3231300367"/>
       </p:ext>
     </p:extLst>
   </p:cSld>
@@ -1081,7 +1138,7 @@
     </p:spTree>
     <p:extLst>
       <p:ext uri="{BB962C8B-B14F-4D97-AF65-F5344CB8AC3E}">
-        <p14:creationId xmlns:p14="http://schemas.microsoft.com/office/powerpoint/2010/main" xmlns="" val="2645942092"/>
+        <p14:creationId xmlns:p14="http://schemas.microsoft.com/office/powerpoint/2010/main" val="2645942092"/>
       </p:ext>
     </p:extLst>
   </p:cSld>
@@ -1474,7 +1531,7 @@
     </p:spTree>
     <p:extLst>
       <p:ext uri="{BB962C8B-B14F-4D97-AF65-F5344CB8AC3E}">
-        <p14:creationId xmlns:p14="http://schemas.microsoft.com/office/powerpoint/2010/main" xmlns="" val="1436837154"/>
+        <p14:creationId xmlns:p14="http://schemas.microsoft.com/office/powerpoint/2010/main" val="1436837154"/>
       </p:ext>
     </p:extLst>
   </p:cSld>
@@ -1559,7 +1616,457 @@
     </p:spTree>
     <p:extLst>
       <p:ext uri="{BB962C8B-B14F-4D97-AF65-F5344CB8AC3E}">
-        <p14:creationId xmlns:p14="http://schemas.microsoft.com/office/powerpoint/2010/main" xmlns="" val="2883505231"/>
+        <p14:creationId xmlns:p14="http://schemas.microsoft.com/office/powerpoint/2010/main" val="2883505231"/>
+      </p:ext>
+    </p:extLst>
+  </p:cSld>
+  <p:clrMapOvr>
+    <a:masterClrMapping/>
+  </p:clrMapOvr>
+</p:notes>
+</file>
+
+<file path=ppt/notesSlides/notesSlide5.xml><?xml version="1.0" encoding="utf-8"?>
+<p:notes xmlns:a="http://schemas.openxmlformats.org/drawingml/2006/main" xmlns:r="http://schemas.openxmlformats.org/officeDocument/2006/relationships" xmlns:p="http://schemas.openxmlformats.org/presentationml/2006/main">
+  <p:cSld>
+    <p:spTree>
+      <p:nvGrpSpPr>
+        <p:cNvPr id="1" name=""/>
+        <p:cNvGrpSpPr/>
+        <p:nvPr/>
+      </p:nvGrpSpPr>
+      <p:grpSpPr>
+        <a:xfrm>
+          <a:off x="0" y="0"/>
+          <a:ext cx="0" cy="0"/>
+          <a:chOff x="0" y="0"/>
+          <a:chExt cx="0" cy="0"/>
+        </a:xfrm>
+      </p:grpSpPr>
+      <p:sp>
+        <p:nvSpPr>
+          <p:cNvPr id="2" name="Espace réservé de l'image des diapositives 1"/>
+          <p:cNvSpPr>
+            <a:spLocks noGrp="1" noRot="1" noChangeAspect="1"/>
+          </p:cNvSpPr>
+          <p:nvPr>
+            <p:ph type="sldImg"/>
+          </p:nvPr>
+        </p:nvSpPr>
+        <p:spPr/>
+      </p:sp>
+      <p:sp>
+        <p:nvSpPr>
+          <p:cNvPr id="3" name="Espace réservé des commentaires 2"/>
+          <p:cNvSpPr>
+            <a:spLocks noGrp="1"/>
+          </p:cNvSpPr>
+          <p:nvPr>
+            <p:ph type="body" idx="1"/>
+          </p:nvPr>
+        </p:nvSpPr>
+        <p:spPr/>
+        <p:txBody>
+          <a:bodyPr/>
+          <a:lstStyle/>
+          <a:p>
+            <a:endParaRPr lang="fr-FR"/>
+          </a:p>
+        </p:txBody>
+      </p:sp>
+      <p:sp>
+        <p:nvSpPr>
+          <p:cNvPr id="4" name="Espace réservé du numéro de diapositive 3"/>
+          <p:cNvSpPr>
+            <a:spLocks noGrp="1"/>
+          </p:cNvSpPr>
+          <p:nvPr>
+            <p:ph type="sldNum" sz="quarter" idx="10"/>
+          </p:nvPr>
+        </p:nvSpPr>
+        <p:spPr/>
+        <p:txBody>
+          <a:bodyPr/>
+          <a:lstStyle/>
+          <a:p>
+            <a:pPr>
+              <a:defRPr/>
+            </a:pPr>
+            <a:fld id="{1BB7E99A-B2FF-4C0C-BBBB-55947CE30373}" type="slidenum">
+              <a:rPr lang="fr-FR" smtClean="0"/>
+              <a:pPr>
+                <a:defRPr/>
+              </a:pPr>
+              <a:t>5</a:t>
+            </a:fld>
+            <a:endParaRPr lang="fr-FR"/>
+          </a:p>
+        </p:txBody>
+      </p:sp>
+    </p:spTree>
+    <p:extLst>
+      <p:ext uri="{BB962C8B-B14F-4D97-AF65-F5344CB8AC3E}">
+        <p14:creationId xmlns:p14="http://schemas.microsoft.com/office/powerpoint/2010/main" val="765126400"/>
+      </p:ext>
+    </p:extLst>
+  </p:cSld>
+  <p:clrMapOvr>
+    <a:masterClrMapping/>
+  </p:clrMapOvr>
+</p:notes>
+</file>
+
+<file path=ppt/notesSlides/notesSlide6.xml><?xml version="1.0" encoding="utf-8"?>
+<p:notes xmlns:a="http://schemas.openxmlformats.org/drawingml/2006/main" xmlns:r="http://schemas.openxmlformats.org/officeDocument/2006/relationships" xmlns:p="http://schemas.openxmlformats.org/presentationml/2006/main">
+  <p:cSld>
+    <p:spTree>
+      <p:nvGrpSpPr>
+        <p:cNvPr id="1" name=""/>
+        <p:cNvGrpSpPr/>
+        <p:nvPr/>
+      </p:nvGrpSpPr>
+      <p:grpSpPr>
+        <a:xfrm>
+          <a:off x="0" y="0"/>
+          <a:ext cx="0" cy="0"/>
+          <a:chOff x="0" y="0"/>
+          <a:chExt cx="0" cy="0"/>
+        </a:xfrm>
+      </p:grpSpPr>
+      <p:sp>
+        <p:nvSpPr>
+          <p:cNvPr id="2" name="Espace réservé de l'image des diapositives 1"/>
+          <p:cNvSpPr>
+            <a:spLocks noGrp="1" noRot="1" noChangeAspect="1"/>
+          </p:cNvSpPr>
+          <p:nvPr>
+            <p:ph type="sldImg"/>
+          </p:nvPr>
+        </p:nvSpPr>
+        <p:spPr/>
+      </p:sp>
+      <p:sp>
+        <p:nvSpPr>
+          <p:cNvPr id="3" name="Espace réservé des commentaires 2"/>
+          <p:cNvSpPr>
+            <a:spLocks noGrp="1"/>
+          </p:cNvSpPr>
+          <p:nvPr>
+            <p:ph type="body" idx="1"/>
+          </p:nvPr>
+        </p:nvSpPr>
+        <p:spPr/>
+        <p:txBody>
+          <a:bodyPr/>
+          <a:lstStyle/>
+          <a:p>
+            <a:endParaRPr lang="fr-FR"/>
+          </a:p>
+        </p:txBody>
+      </p:sp>
+      <p:sp>
+        <p:nvSpPr>
+          <p:cNvPr id="4" name="Espace réservé du numéro de diapositive 3"/>
+          <p:cNvSpPr>
+            <a:spLocks noGrp="1"/>
+          </p:cNvSpPr>
+          <p:nvPr>
+            <p:ph type="sldNum" sz="quarter" idx="10"/>
+          </p:nvPr>
+        </p:nvSpPr>
+        <p:spPr/>
+        <p:txBody>
+          <a:bodyPr/>
+          <a:lstStyle/>
+          <a:p>
+            <a:pPr>
+              <a:defRPr/>
+            </a:pPr>
+            <a:fld id="{1BB7E99A-B2FF-4C0C-BBBB-55947CE30373}" type="slidenum">
+              <a:rPr lang="fr-FR" smtClean="0"/>
+              <a:pPr>
+                <a:defRPr/>
+              </a:pPr>
+              <a:t>6</a:t>
+            </a:fld>
+            <a:endParaRPr lang="fr-FR"/>
+          </a:p>
+        </p:txBody>
+      </p:sp>
+    </p:spTree>
+    <p:extLst>
+      <p:ext uri="{BB962C8B-B14F-4D97-AF65-F5344CB8AC3E}">
+        <p14:creationId xmlns:p14="http://schemas.microsoft.com/office/powerpoint/2010/main" val="1254531414"/>
+      </p:ext>
+    </p:extLst>
+  </p:cSld>
+  <p:clrMapOvr>
+    <a:masterClrMapping/>
+  </p:clrMapOvr>
+</p:notes>
+</file>
+
+<file path=ppt/notesSlides/notesSlide7.xml><?xml version="1.0" encoding="utf-8"?>
+<p:notes xmlns:a="http://schemas.openxmlformats.org/drawingml/2006/main" xmlns:r="http://schemas.openxmlformats.org/officeDocument/2006/relationships" xmlns:p="http://schemas.openxmlformats.org/presentationml/2006/main">
+  <p:cSld>
+    <p:spTree>
+      <p:nvGrpSpPr>
+        <p:cNvPr id="1" name=""/>
+        <p:cNvGrpSpPr/>
+        <p:nvPr/>
+      </p:nvGrpSpPr>
+      <p:grpSpPr>
+        <a:xfrm>
+          <a:off x="0" y="0"/>
+          <a:ext cx="0" cy="0"/>
+          <a:chOff x="0" y="0"/>
+          <a:chExt cx="0" cy="0"/>
+        </a:xfrm>
+      </p:grpSpPr>
+      <p:sp>
+        <p:nvSpPr>
+          <p:cNvPr id="2" name="Espace réservé de l'image des diapositives 1"/>
+          <p:cNvSpPr>
+            <a:spLocks noGrp="1" noRot="1" noChangeAspect="1"/>
+          </p:cNvSpPr>
+          <p:nvPr>
+            <p:ph type="sldImg"/>
+          </p:nvPr>
+        </p:nvSpPr>
+        <p:spPr/>
+      </p:sp>
+      <p:sp>
+        <p:nvSpPr>
+          <p:cNvPr id="3" name="Espace réservé des commentaires 2"/>
+          <p:cNvSpPr>
+            <a:spLocks noGrp="1"/>
+          </p:cNvSpPr>
+          <p:nvPr>
+            <p:ph type="body" idx="1"/>
+          </p:nvPr>
+        </p:nvSpPr>
+        <p:spPr/>
+        <p:txBody>
+          <a:bodyPr/>
+          <a:lstStyle/>
+          <a:p>
+            <a:endParaRPr lang="fr-FR"/>
+          </a:p>
+        </p:txBody>
+      </p:sp>
+      <p:sp>
+        <p:nvSpPr>
+          <p:cNvPr id="4" name="Espace réservé du numéro de diapositive 3"/>
+          <p:cNvSpPr>
+            <a:spLocks noGrp="1"/>
+          </p:cNvSpPr>
+          <p:nvPr>
+            <p:ph type="sldNum" sz="quarter" idx="10"/>
+          </p:nvPr>
+        </p:nvSpPr>
+        <p:spPr/>
+        <p:txBody>
+          <a:bodyPr/>
+          <a:lstStyle/>
+          <a:p>
+            <a:pPr>
+              <a:defRPr/>
+            </a:pPr>
+            <a:fld id="{1BB7E99A-B2FF-4C0C-BBBB-55947CE30373}" type="slidenum">
+              <a:rPr lang="fr-FR" smtClean="0"/>
+              <a:pPr>
+                <a:defRPr/>
+              </a:pPr>
+              <a:t>7</a:t>
+            </a:fld>
+            <a:endParaRPr lang="fr-FR"/>
+          </a:p>
+        </p:txBody>
+      </p:sp>
+    </p:spTree>
+    <p:extLst>
+      <p:ext uri="{BB962C8B-B14F-4D97-AF65-F5344CB8AC3E}">
+        <p14:creationId xmlns:p14="http://schemas.microsoft.com/office/powerpoint/2010/main" val="3937779277"/>
+      </p:ext>
+    </p:extLst>
+  </p:cSld>
+  <p:clrMapOvr>
+    <a:masterClrMapping/>
+  </p:clrMapOvr>
+</p:notes>
+</file>
+
+<file path=ppt/notesSlides/notesSlide8.xml><?xml version="1.0" encoding="utf-8"?>
+<p:notes xmlns:a="http://schemas.openxmlformats.org/drawingml/2006/main" xmlns:r="http://schemas.openxmlformats.org/officeDocument/2006/relationships" xmlns:p="http://schemas.openxmlformats.org/presentationml/2006/main">
+  <p:cSld>
+    <p:spTree>
+      <p:nvGrpSpPr>
+        <p:cNvPr id="1" name=""/>
+        <p:cNvGrpSpPr/>
+        <p:nvPr/>
+      </p:nvGrpSpPr>
+      <p:grpSpPr>
+        <a:xfrm>
+          <a:off x="0" y="0"/>
+          <a:ext cx="0" cy="0"/>
+          <a:chOff x="0" y="0"/>
+          <a:chExt cx="0" cy="0"/>
+        </a:xfrm>
+      </p:grpSpPr>
+      <p:sp>
+        <p:nvSpPr>
+          <p:cNvPr id="2" name="Espace réservé de l'image des diapositives 1"/>
+          <p:cNvSpPr>
+            <a:spLocks noGrp="1" noRot="1" noChangeAspect="1"/>
+          </p:cNvSpPr>
+          <p:nvPr>
+            <p:ph type="sldImg"/>
+          </p:nvPr>
+        </p:nvSpPr>
+        <p:spPr/>
+      </p:sp>
+      <p:sp>
+        <p:nvSpPr>
+          <p:cNvPr id="3" name="Espace réservé des commentaires 2"/>
+          <p:cNvSpPr>
+            <a:spLocks noGrp="1"/>
+          </p:cNvSpPr>
+          <p:nvPr>
+            <p:ph type="body" idx="1"/>
+          </p:nvPr>
+        </p:nvSpPr>
+        <p:spPr/>
+        <p:txBody>
+          <a:bodyPr/>
+          <a:lstStyle/>
+          <a:p>
+            <a:endParaRPr lang="fr-FR"/>
+          </a:p>
+        </p:txBody>
+      </p:sp>
+      <p:sp>
+        <p:nvSpPr>
+          <p:cNvPr id="4" name="Espace réservé du numéro de diapositive 3"/>
+          <p:cNvSpPr>
+            <a:spLocks noGrp="1"/>
+          </p:cNvSpPr>
+          <p:nvPr>
+            <p:ph type="sldNum" sz="quarter" idx="10"/>
+          </p:nvPr>
+        </p:nvSpPr>
+        <p:spPr/>
+        <p:txBody>
+          <a:bodyPr/>
+          <a:lstStyle/>
+          <a:p>
+            <a:pPr>
+              <a:defRPr/>
+            </a:pPr>
+            <a:fld id="{1BB7E99A-B2FF-4C0C-BBBB-55947CE30373}" type="slidenum">
+              <a:rPr lang="fr-FR" smtClean="0"/>
+              <a:pPr>
+                <a:defRPr/>
+              </a:pPr>
+              <a:t>8</a:t>
+            </a:fld>
+            <a:endParaRPr lang="fr-FR"/>
+          </a:p>
+        </p:txBody>
+      </p:sp>
+    </p:spTree>
+    <p:extLst>
+      <p:ext uri="{BB962C8B-B14F-4D97-AF65-F5344CB8AC3E}">
+        <p14:creationId xmlns:p14="http://schemas.microsoft.com/office/powerpoint/2010/main" val="765126400"/>
+      </p:ext>
+    </p:extLst>
+  </p:cSld>
+  <p:clrMapOvr>
+    <a:masterClrMapping/>
+  </p:clrMapOvr>
+</p:notes>
+</file>
+
+<file path=ppt/notesSlides/notesSlide9.xml><?xml version="1.0" encoding="utf-8"?>
+<p:notes xmlns:a="http://schemas.openxmlformats.org/drawingml/2006/main" xmlns:r="http://schemas.openxmlformats.org/officeDocument/2006/relationships" xmlns:p="http://schemas.openxmlformats.org/presentationml/2006/main">
+  <p:cSld>
+    <p:spTree>
+      <p:nvGrpSpPr>
+        <p:cNvPr id="1" name=""/>
+        <p:cNvGrpSpPr/>
+        <p:nvPr/>
+      </p:nvGrpSpPr>
+      <p:grpSpPr>
+        <a:xfrm>
+          <a:off x="0" y="0"/>
+          <a:ext cx="0" cy="0"/>
+          <a:chOff x="0" y="0"/>
+          <a:chExt cx="0" cy="0"/>
+        </a:xfrm>
+      </p:grpSpPr>
+      <p:sp>
+        <p:nvSpPr>
+          <p:cNvPr id="2" name="Espace réservé de l'image des diapositives 1"/>
+          <p:cNvSpPr>
+            <a:spLocks noGrp="1" noRot="1" noChangeAspect="1"/>
+          </p:cNvSpPr>
+          <p:nvPr>
+            <p:ph type="sldImg"/>
+          </p:nvPr>
+        </p:nvSpPr>
+        <p:spPr/>
+      </p:sp>
+      <p:sp>
+        <p:nvSpPr>
+          <p:cNvPr id="3" name="Espace réservé des commentaires 2"/>
+          <p:cNvSpPr>
+            <a:spLocks noGrp="1"/>
+          </p:cNvSpPr>
+          <p:nvPr>
+            <p:ph type="body" idx="1"/>
+          </p:nvPr>
+        </p:nvSpPr>
+        <p:spPr/>
+        <p:txBody>
+          <a:bodyPr/>
+          <a:lstStyle/>
+          <a:p>
+            <a:endParaRPr lang="fr-FR"/>
+          </a:p>
+        </p:txBody>
+      </p:sp>
+      <p:sp>
+        <p:nvSpPr>
+          <p:cNvPr id="4" name="Espace réservé du numéro de diapositive 3"/>
+          <p:cNvSpPr>
+            <a:spLocks noGrp="1"/>
+          </p:cNvSpPr>
+          <p:nvPr>
+            <p:ph type="sldNum" sz="quarter" idx="10"/>
+          </p:nvPr>
+        </p:nvSpPr>
+        <p:spPr/>
+        <p:txBody>
+          <a:bodyPr/>
+          <a:lstStyle/>
+          <a:p>
+            <a:pPr>
+              <a:defRPr/>
+            </a:pPr>
+            <a:fld id="{1BB7E99A-B2FF-4C0C-BBBB-55947CE30373}" type="slidenum">
+              <a:rPr lang="fr-FR" smtClean="0"/>
+              <a:pPr>
+                <a:defRPr/>
+              </a:pPr>
+              <a:t>9</a:t>
+            </a:fld>
+            <a:endParaRPr lang="fr-FR"/>
+          </a:p>
+        </p:txBody>
+      </p:sp>
+    </p:spTree>
+    <p:extLst>
+      <p:ext uri="{BB962C8B-B14F-4D97-AF65-F5344CB8AC3E}">
+        <p14:creationId xmlns:p14="http://schemas.microsoft.com/office/powerpoint/2010/main" val="2488583898"/>
       </p:ext>
     </p:extLst>
   </p:cSld>
@@ -5159,7 +5666,7 @@
     </p:spTree>
     <p:extLst>
       <p:ext uri="{BB962C8B-B14F-4D97-AF65-F5344CB8AC3E}">
-        <p14:creationId xmlns:p14="http://schemas.microsoft.com/office/powerpoint/2010/main" xmlns="" val="3974948217"/>
+        <p14:creationId xmlns:p14="http://schemas.microsoft.com/office/powerpoint/2010/main" val="3974948217"/>
       </p:ext>
     </p:extLst>
   </p:cSld>
@@ -5231,7 +5738,7 @@
             <p:ph idx="1"/>
             <p:extLst>
               <p:ext uri="{D42A27DB-BD31-4B8C-83A1-F6EECF244321}">
-                <p14:modId xmlns:p14="http://schemas.microsoft.com/office/powerpoint/2010/main" xmlns="" val="442573492"/>
+                <p14:modId xmlns:p14="http://schemas.microsoft.com/office/powerpoint/2010/main" val="442573492"/>
               </p:ext>
             </p:extLst>
           </p:nvPr>
@@ -5249,7 +5756,7 @@
     </p:spTree>
     <p:extLst>
       <p:ext uri="{BB962C8B-B14F-4D97-AF65-F5344CB8AC3E}">
-        <p14:creationId xmlns:p14="http://schemas.microsoft.com/office/powerpoint/2010/main" xmlns="" val="4166857735"/>
+        <p14:creationId xmlns:p14="http://schemas.microsoft.com/office/powerpoint/2010/main" val="4166857735"/>
       </p:ext>
     </p:extLst>
   </p:cSld>
@@ -5393,7 +5900,7 @@
     </p:spTree>
     <p:extLst>
       <p:ext uri="{BB962C8B-B14F-4D97-AF65-F5344CB8AC3E}">
-        <p14:creationId xmlns:p14="http://schemas.microsoft.com/office/powerpoint/2010/main" xmlns="" val="519709667"/>
+        <p14:creationId xmlns:p14="http://schemas.microsoft.com/office/powerpoint/2010/main" val="519709667"/>
       </p:ext>
     </p:extLst>
   </p:cSld>
@@ -5539,7 +6046,7 @@
     </p:spTree>
     <p:extLst>
       <p:ext uri="{BB962C8B-B14F-4D97-AF65-F5344CB8AC3E}">
-        <p14:creationId xmlns:p14="http://schemas.microsoft.com/office/powerpoint/2010/main" xmlns="" val="1603614356"/>
+        <p14:creationId xmlns:p14="http://schemas.microsoft.com/office/powerpoint/2010/main" val="1603614356"/>
       </p:ext>
     </p:extLst>
   </p:cSld>
@@ -5679,7 +6186,7 @@
     </p:spTree>
     <p:extLst>
       <p:ext uri="{BB962C8B-B14F-4D97-AF65-F5344CB8AC3E}">
-        <p14:creationId xmlns:p14="http://schemas.microsoft.com/office/powerpoint/2010/main" xmlns="" val="313456132"/>
+        <p14:creationId xmlns:p14="http://schemas.microsoft.com/office/powerpoint/2010/main" val="313456132"/>
       </p:ext>
     </p:extLst>
   </p:cSld>
@@ -5730,7 +6237,7 @@
           <a:p>
             <a:r>
               <a:rPr lang="fr-FR" dirty="0" smtClean="0"/>
-              <a:t>Restitution - Jasper</a:t>
+              <a:t>Restitution - JASPER</a:t>
             </a:r>
             <a:endParaRPr lang="fr-FR" dirty="0"/>
           </a:p>
@@ -5746,31 +6253,78 @@
             <p:ph sz="half" idx="1"/>
           </p:nvPr>
         </p:nvSpPr>
-        <p:spPr/>
-        <p:txBody>
-          <a:bodyPr/>
-          <a:lstStyle/>
+        <p:spPr>
+          <a:xfrm>
+            <a:off x="1475656" y="1268760"/>
+            <a:ext cx="7224462" cy="5257800"/>
+          </a:xfrm>
+        </p:spPr>
+        <p:txBody>
+          <a:bodyPr/>
+          <a:lstStyle/>
+          <a:p>
+            <a:r>
+              <a:rPr lang="fr-FR" dirty="0" smtClean="0"/>
+              <a:t>Profil </a:t>
+            </a:r>
+            <a:r>
+              <a:rPr lang="fr-FR" dirty="0" smtClean="0"/>
+              <a:t>responsable </a:t>
+            </a:r>
+            <a:r>
+              <a:rPr lang="fr-FR" dirty="0" smtClean="0"/>
+              <a:t>Magasin complet</a:t>
+            </a:r>
+          </a:p>
           <a:p>
             <a:endParaRPr lang="fr-FR" dirty="0"/>
           </a:p>
-        </p:txBody>
-      </p:sp>
-      <p:sp>
-        <p:nvSpPr>
-          <p:cNvPr id="4" name="Espace réservé du contenu 3"/>
-          <p:cNvSpPr>
-            <a:spLocks noGrp="1"/>
-          </p:cNvSpPr>
-          <p:nvPr>
-            <p:ph sz="half" idx="2"/>
-          </p:nvPr>
-        </p:nvSpPr>
-        <p:spPr/>
-        <p:txBody>
-          <a:bodyPr/>
-          <a:lstStyle/>
-          <a:p>
-            <a:endParaRPr lang="fr-FR"/>
+          <a:p>
+            <a:r>
+              <a:rPr lang="fr-FR" dirty="0" smtClean="0"/>
+              <a:t>Tableaux et graphiques</a:t>
+            </a:r>
+            <a:endParaRPr lang="fr-FR" dirty="0" smtClean="0"/>
+          </a:p>
+          <a:p>
+            <a:endParaRPr lang="fr-FR" dirty="0"/>
+          </a:p>
+          <a:p>
+            <a:r>
+              <a:rPr lang="fr-FR" dirty="0" smtClean="0"/>
+              <a:t>Temps chargement pour certains tableaux</a:t>
+            </a:r>
+          </a:p>
+          <a:p>
+            <a:endParaRPr lang="fr-FR" dirty="0"/>
+          </a:p>
+          <a:p>
+            <a:r>
+              <a:rPr lang="fr-FR" dirty="0" smtClean="0"/>
+              <a:t>Mise en forme conforme au SFD</a:t>
+            </a:r>
+          </a:p>
+          <a:p>
+            <a:endParaRPr lang="fr-FR" dirty="0"/>
+          </a:p>
+          <a:p>
+            <a:r>
+              <a:rPr lang="fr-FR" dirty="0" smtClean="0"/>
+              <a:t>Paramètre période/mois à implémenter</a:t>
+            </a:r>
+            <a:endParaRPr lang="fr-FR" dirty="0" smtClean="0"/>
+          </a:p>
+          <a:p>
+            <a:endParaRPr lang="fr-FR" dirty="0"/>
+          </a:p>
+          <a:p>
+            <a:endParaRPr lang="fr-FR" dirty="0" smtClean="0"/>
+          </a:p>
+          <a:p>
+            <a:endParaRPr lang="fr-FR" dirty="0"/>
+          </a:p>
+          <a:p>
+            <a:endParaRPr lang="fr-FR" dirty="0" smtClean="0"/>
           </a:p>
         </p:txBody>
       </p:sp>
@@ -5806,7 +6360,7 @@
     </p:spTree>
     <p:extLst>
       <p:ext uri="{BB962C8B-B14F-4D97-AF65-F5344CB8AC3E}">
-        <p14:creationId xmlns:p14="http://schemas.microsoft.com/office/powerpoint/2010/main" xmlns="" val="3643040349"/>
+        <p14:creationId xmlns:p14="http://schemas.microsoft.com/office/powerpoint/2010/main" val="3402124348"/>
       </p:ext>
     </p:extLst>
   </p:cSld>
@@ -5924,7 +6478,7 @@
           </p:nvPr>
         </p:nvPicPr>
         <p:blipFill>
-          <a:blip r:embed="rId2" cstate="print"/>
+          <a:blip r:embed="rId3" cstate="print"/>
           <a:stretch>
             <a:fillRect/>
           </a:stretch>
@@ -6787,6 +7341,14 @@
 </file>
 
 <file path=customXml/item1.xml><?xml version="1.0" encoding="utf-8"?>
+<ct:contentTypeSchema xmlns:ct="http://schemas.microsoft.com/office/2006/metadata/contentType" xmlns:ma="http://schemas.microsoft.com/office/2006/metadata/properties/metaAttributes" ct:_="" ma:_="" ma:contentTypeName="TemplateFile" ma:contentTypeID="0x01010069924D1ECC420D47A2456556BC94F7370400BDF4491DEA4973499845289601F88B9F" ma:contentTypeVersion="33" ma:contentTypeDescription="Create a new document." ma:contentTypeScope="" ma:versionID="88ac0aa07b72c9aa809fa1ac53baba74"/>
+</file>
+
+<file path=customXml/item2.xml><?xml version="1.0" encoding="utf-8"?>
+<p:properties xmlns:p="http://schemas.microsoft.com/office/2006/metadata/properties" xmlns:xsi="http://www.w3.org/2001/XMLSchema-instance" xmlns:pc="http://schemas.microsoft.com/office/infopath/2007/PartnerControls"/>
+</file>
+
+<file path=customXml/item3.xml><?xml version="1.0" encoding="utf-8"?>
 <?mso-contentType ?>
 <FormTemplates xmlns="http://schemas.microsoft.com/sharepoint/v3/contenttype/forms">
   <Display>DocumentLibraryForm</Display>
@@ -6795,18 +7357,11 @@
 </FormTemplates>
 </file>
 
-<file path=customXml/item2.xml><?xml version="1.0" encoding="utf-8"?>
-<p:properties xmlns:p="http://schemas.microsoft.com/office/2006/metadata/properties" xmlns:xsi="http://www.w3.org/2001/XMLSchema-instance" xmlns:pc="http://schemas.microsoft.com/office/infopath/2007/PartnerControls"/>
-</file>
-
-<file path=customXml/item3.xml><?xml version="1.0" encoding="utf-8"?>
-<ct:contentTypeSchema xmlns:ct="http://schemas.microsoft.com/office/2006/metadata/contentType" xmlns:ma="http://schemas.microsoft.com/office/2006/metadata/properties/metaAttributes" ct:_="" ma:_="" ma:contentTypeName="TemplateFile" ma:contentTypeID="0x01010069924D1ECC420D47A2456556BC94F7370400BDF4491DEA4973499845289601F88B9F" ma:contentTypeVersion="33" ma:contentTypeDescription="Create a new document." ma:contentTypeScope="" ma:versionID="88ac0aa07b72c9aa809fa1ac53baba74"/>
-</file>
-
 <file path=customXml/itemProps1.xml><?xml version="1.0" encoding="utf-8"?>
-<ds:datastoreItem xmlns:ds="http://schemas.openxmlformats.org/officeDocument/2006/customXml" ds:itemID="{19596DCE-F5C7-4BA8-8C0E-563C7612AC94}">
+<ds:datastoreItem xmlns:ds="http://schemas.openxmlformats.org/officeDocument/2006/customXml" ds:itemID="{AADC9AFC-E9BE-407C-9919-F905586C6F5A}">
   <ds:schemaRefs>
-    <ds:schemaRef ds:uri="http://schemas.microsoft.com/sharepoint/v3/contenttype/forms"/>
+    <ds:schemaRef ds:uri="http://schemas.microsoft.com/office/2006/metadata/contentType"/>
+    <ds:schemaRef ds:uri="http://schemas.microsoft.com/office/2006/metadata/properties/metaAttributes"/>
   </ds:schemaRefs>
 </ds:datastoreItem>
 </file>
@@ -6821,10 +7376,9 @@
 </file>
 
 <file path=customXml/itemProps3.xml><?xml version="1.0" encoding="utf-8"?>
-<ds:datastoreItem xmlns:ds="http://schemas.openxmlformats.org/officeDocument/2006/customXml" ds:itemID="{AADC9AFC-E9BE-407C-9919-F905586C6F5A}">
+<ds:datastoreItem xmlns:ds="http://schemas.openxmlformats.org/officeDocument/2006/customXml" ds:itemID="{19596DCE-F5C7-4BA8-8C0E-563C7612AC94}">
   <ds:schemaRefs>
-    <ds:schemaRef ds:uri="http://schemas.microsoft.com/office/2006/metadata/contentType"/>
-    <ds:schemaRef ds:uri="http://schemas.microsoft.com/office/2006/metadata/properties/metaAttributes"/>
+    <ds:schemaRef ds:uri="http://schemas.microsoft.com/sharepoint/v3/contenttype/forms"/>
   </ds:schemaRefs>
 </ds:datastoreItem>
 </file>
</xml_diff>